<commit_message>
Updating summary flow chart wording
</commit_message>
<xml_diff>
--- a/images/Summary flow chart of mitigators.pptx
+++ b/images/Summary flow chart of mitigators.pptx
@@ -104,19 +104,48 @@
       </a:defRPr>
     </a:lvl9pPr>
   </p:defaultTextStyle>
+  <p:extLst>
+    <p:ext uri="{EFAFB233-063F-42B5-8137-9DF3F51BA10A}">
+      <p15:sldGuideLst xmlns:p15="http://schemas.microsoft.com/office/powerpoint/2012/main"/>
+    </p:ext>
+  </p:extLst>
 </p:presentation>
 </file>
 
 <file path=ppt/revisionInfo.xml><?xml version="1.0" encoding="utf-8"?>
 <p1510:revInfo xmlns:a="http://schemas.openxmlformats.org/drawingml/2006/main" xmlns:r="http://schemas.openxmlformats.org/officeDocument/2006/relationships" xmlns:p1510="http://schemas.microsoft.com/office/powerpoint/2015/10/main">
   <p1510:revLst>
-    <p1510:client id="{3554D4D1-15DE-491A-B57A-A3CDF5847AB1}" v="65" dt="2025-04-02T13:54:56.935"/>
+    <p1510:client id="{E9F0CF1C-4257-4C6D-BA25-9423DCEEA916}" v="4" dt="2025-10-01T08:54:04.493"/>
   </p1510:revLst>
 </p1510:revInfo>
 </file>
 
 <file path=ppt/changesInfos/changesInfo1.xml><?xml version="1.0" encoding="utf-8"?>
 <pc:chgInfo xmlns:a="http://schemas.openxmlformats.org/drawingml/2006/main" xmlns:r="http://schemas.openxmlformats.org/officeDocument/2006/relationships" xmlns:ac="http://schemas.microsoft.com/office/drawing/2013/main/command" xmlns:pc="http://schemas.microsoft.com/office/powerpoint/2013/main/command">
+  <pc:docChgLst>
+    <pc:chgData name="LUCAS, Sarah (NHS MIDLANDS AND LANCASHIRE COMMISSIONING SUPPORT UNIT)" userId="38d850f4-2bd6-44fc-befc-0df38bbe347f" providerId="ADAL" clId="{B0AFC1F4-0421-4552-AAC2-9D6DA9CC8846}"/>
+    <pc:docChg chg="custSel modSld">
+      <pc:chgData name="LUCAS, Sarah (NHS MIDLANDS AND LANCASHIRE COMMISSIONING SUPPORT UNIT)" userId="38d850f4-2bd6-44fc-befc-0df38bbe347f" providerId="ADAL" clId="{B0AFC1F4-0421-4552-AAC2-9D6DA9CC8846}" dt="2025-10-01T08:55:13.248" v="176" actId="20577"/>
+      <pc:docMkLst>
+        <pc:docMk/>
+      </pc:docMkLst>
+      <pc:sldChg chg="modSp mod">
+        <pc:chgData name="LUCAS, Sarah (NHS MIDLANDS AND LANCASHIRE COMMISSIONING SUPPORT UNIT)" userId="38d850f4-2bd6-44fc-befc-0df38bbe347f" providerId="ADAL" clId="{B0AFC1F4-0421-4552-AAC2-9D6DA9CC8846}" dt="2025-10-01T08:55:13.248" v="176" actId="20577"/>
+        <pc:sldMkLst>
+          <pc:docMk/>
+          <pc:sldMk cId="563537808" sldId="256"/>
+        </pc:sldMkLst>
+        <pc:graphicFrameChg chg="mod modGraphic">
+          <ac:chgData name="LUCAS, Sarah (NHS MIDLANDS AND LANCASHIRE COMMISSIONING SUPPORT UNIT)" userId="38d850f4-2bd6-44fc-befc-0df38bbe347f" providerId="ADAL" clId="{B0AFC1F4-0421-4552-AAC2-9D6DA9CC8846}" dt="2025-10-01T08:55:13.248" v="176" actId="20577"/>
+          <ac:graphicFrameMkLst>
+            <pc:docMk/>
+            <pc:sldMk cId="563537808" sldId="256"/>
+            <ac:graphicFrameMk id="5" creationId="{964AB335-0B90-1881-ED69-AC91C481E23B}"/>
+          </ac:graphicFrameMkLst>
+        </pc:graphicFrameChg>
+      </pc:sldChg>
+    </pc:docChg>
+  </pc:docChgLst>
   <pc:docChgLst>
     <pc:chgData name="LUCAS, Sarah (NHS MIDLANDS AND LANCASHIRE COMMISSIONING SUPPORT UNIT)" userId="38d850f4-2bd6-44fc-befc-0df38bbe347f" providerId="ADAL" clId="{3554D4D1-15DE-491A-B57A-A3CDF5847AB1}"/>
     <pc:docChg chg="modSld">
@@ -130,14 +159,6 @@
           <pc:docMk/>
           <pc:sldMk cId="563537808" sldId="256"/>
         </pc:sldMkLst>
-        <pc:graphicFrameChg chg="mod">
-          <ac:chgData name="LUCAS, Sarah (NHS MIDLANDS AND LANCASHIRE COMMISSIONING SUPPORT UNIT)" userId="38d850f4-2bd6-44fc-befc-0df38bbe347f" providerId="ADAL" clId="{3554D4D1-15DE-491A-B57A-A3CDF5847AB1}" dt="2025-04-02T13:54:56.934" v="64" actId="5736"/>
-          <ac:graphicFrameMkLst>
-            <pc:docMk/>
-            <pc:sldMk cId="563537808" sldId="256"/>
-            <ac:graphicFrameMk id="5" creationId="{964AB335-0B90-1881-ED69-AC91C481E23B}"/>
-          </ac:graphicFrameMkLst>
-        </pc:graphicFrameChg>
       </pc:sldChg>
     </pc:docChg>
   </pc:docChgLst>
@@ -927,7 +948,7 @@
                 <a:schemeClr val="tx1"/>
               </a:solidFill>
             </a:rPr>
-            <a:t>Mitigation</a:t>
+            <a:t>Potentially mitigable activity </a:t>
           </a:r>
         </a:p>
       </dgm:t>
@@ -1722,7 +1743,7 @@
                 <a:schemeClr val="tx1"/>
               </a:solidFill>
             </a:rPr>
-            <a:t>Implicit – (4 mitigators) Antidiabetics, Benzos, Diuretics, NSAIDs </a:t>
+            <a:t>Implicit – (4 categories) Antidiabetics, Benzos, Diuretics, NSAIDs </a:t>
           </a:r>
         </a:p>
       </dgm:t>
@@ -1898,7 +1919,7 @@
                 <a:schemeClr val="tx1"/>
               </a:solidFill>
             </a:rPr>
-            <a:t>Ambulatory Care Sensitive Admissions  (3 mitigators)</a:t>
+            <a:t>Ambulatory Care Sensitive Admissions  (3 categories)</a:t>
           </a:r>
         </a:p>
       </dgm:t>
@@ -2076,7 +2097,7 @@
                 <a:schemeClr val="tx1"/>
               </a:solidFill>
             </a:rPr>
-            <a:t>Admissions with no overnight stay and no procedure                         (2 mitigators)</a:t>
+            <a:t>Admissions with no overnight stay and no procedure                         (2 categories)</a:t>
           </a:r>
         </a:p>
       </dgm:t>
@@ -2218,7 +2239,7 @@
                 <a:schemeClr val="tx1"/>
               </a:solidFill>
             </a:rPr>
-            <a:t>End of Life Care Admissions                   (2 mitigators)</a:t>
+            <a:t>End of Life Care Admissions                   (2 categories)</a:t>
           </a:r>
         </a:p>
       </dgm:t>
@@ -2362,7 +2383,7 @@
                 <a:schemeClr val="tx1"/>
               </a:solidFill>
             </a:rPr>
-            <a:t>Frailty and Older People Admissions   (2 mitigators)</a:t>
+            <a:t>Frailty and Older People Admissions   (2 categories)</a:t>
           </a:r>
         </a:p>
       </dgm:t>
@@ -2770,7 +2791,7 @@
                 <a:schemeClr val="tx1"/>
               </a:solidFill>
             </a:rPr>
-            <a:t>Alcohol related    (3 mitigators)</a:t>
+            <a:t>Alcohol related    (3 categories)</a:t>
           </a:r>
         </a:p>
       </dgm:t>
@@ -2851,8 +2872,21 @@
                 <a:schemeClr val="tx1"/>
               </a:solidFill>
             </a:rPr>
-            <a:t>Mental Health     (3 mitigators)</a:t>
+            <a:t>Mental Health     (</a:t>
           </a:r>
+          <a:r>
+            <a:rPr lang="en-GB" sz="1050">
+              <a:solidFill>
+                <a:schemeClr val="tx1"/>
+              </a:solidFill>
+            </a:rPr>
+            <a:t>3 categories)</a:t>
+          </a:r>
+          <a:endParaRPr lang="en-GB" sz="1050" dirty="0">
+            <a:solidFill>
+              <a:schemeClr val="tx1"/>
+            </a:solidFill>
+          </a:endParaRPr>
         </a:p>
       </dgm:t>
     </dgm:pt>
@@ -3059,7 +3093,7 @@
       <dgm:spPr/>
     </dgm:pt>
     <dgm:pt modelId="{A80E4F36-55B9-428F-8CA9-FC7B77BDD0BB}" type="pres">
-      <dgm:prSet presAssocID="{46CC1AC0-C9DA-4368-B916-5429510F148E}" presName="rootText1" presStyleLbl="node0" presStyleIdx="0" presStyleCnt="1" custLinFactNeighborX="52618" custLinFactNeighborY="-3083">
+      <dgm:prSet presAssocID="{46CC1AC0-C9DA-4368-B916-5429510F148E}" presName="rootText1" presStyleLbl="node0" presStyleIdx="0" presStyleCnt="1" custScaleX="235420" custLinFactNeighborX="52618" custLinFactNeighborY="-3083">
         <dgm:presLayoutVars>
           <dgm:chPref val="3"/>
         </dgm:presLayoutVars>
@@ -5797,8 +5831,8 @@
       </dsp:nvSpPr>
       <dsp:spPr>
         <a:xfrm>
-          <a:off x="6380856" y="0"/>
-          <a:ext cx="1478982" cy="739491"/>
+          <a:off x="5379437" y="0"/>
+          <a:ext cx="3481820" cy="739491"/>
         </a:xfrm>
         <a:prstGeom prst="rect">
           <a:avLst/>
@@ -5853,13 +5887,13 @@
                 <a:schemeClr val="tx1"/>
               </a:solidFill>
             </a:rPr>
-            <a:t>Mitigation</a:t>
+            <a:t>Potentially mitigable activity </a:t>
           </a:r>
         </a:p>
       </dsp:txBody>
       <dsp:txXfrm>
-        <a:off x="6380856" y="0"/>
-        <a:ext cx="1478982" cy="739491"/>
+        <a:off x="5379437" y="0"/>
+        <a:ext cx="3481820" cy="739491"/>
       </dsp:txXfrm>
     </dsp:sp>
     <dsp:sp modelId="{CEFF5A79-EA3B-40A8-A967-79EAFDD0C9F1}">
@@ -6067,7 +6101,7 @@
                 <a:schemeClr val="tx1"/>
               </a:solidFill>
             </a:rPr>
-            <a:t>End of Life Care Admissions                   (2 mitigators)</a:t>
+            <a:t>End of Life Care Admissions                   (2 categories)</a:t>
           </a:r>
         </a:p>
       </dsp:txBody>
@@ -6211,7 +6245,7 @@
                 <a:schemeClr val="tx1"/>
               </a:solidFill>
             </a:rPr>
-            <a:t>Frailty and Older People Admissions   (2 mitigators)</a:t>
+            <a:t>Frailty and Older People Admissions   (2 categories)</a:t>
           </a:r>
         </a:p>
       </dsp:txBody>
@@ -6357,7 +6391,7 @@
                 <a:schemeClr val="tx1"/>
               </a:solidFill>
             </a:rPr>
-            <a:t>Ambulatory Care Sensitive Admissions  (3 mitigators)</a:t>
+            <a:t>Ambulatory Care Sensitive Admissions  (3 categories)</a:t>
           </a:r>
         </a:p>
       </dsp:txBody>
@@ -6505,7 +6539,7 @@
                 <a:schemeClr val="tx1"/>
               </a:solidFill>
             </a:rPr>
-            <a:t>Admissions with no overnight stay and no procedure                         (2 mitigators)</a:t>
+            <a:t>Admissions with no overnight stay and no procedure                         (2 categories)</a:t>
           </a:r>
         </a:p>
       </dsp:txBody>
@@ -6725,7 +6759,7 @@
                 <a:schemeClr val="tx1"/>
               </a:solidFill>
             </a:rPr>
-            <a:t>Implicit – (4 mitigators) Antidiabetics, Benzos, Diuretics, NSAIDs </a:t>
+            <a:t>Implicit – (4 categories) Antidiabetics, Benzos, Diuretics, NSAIDs </a:t>
           </a:r>
         </a:p>
       </dsp:txBody>
@@ -7091,8 +7125,21 @@
                 <a:schemeClr val="tx1"/>
               </a:solidFill>
             </a:rPr>
-            <a:t>Mental Health     (3 mitigators)</a:t>
+            <a:t>Mental Health     (</a:t>
           </a:r>
+          <a:r>
+            <a:rPr lang="en-GB" sz="1050" kern="1200">
+              <a:solidFill>
+                <a:schemeClr val="tx1"/>
+              </a:solidFill>
+            </a:rPr>
+            <a:t>3 categories)</a:t>
+          </a:r>
+          <a:endParaRPr lang="en-GB" sz="1050" kern="1200" dirty="0">
+            <a:solidFill>
+              <a:schemeClr val="tx1"/>
+            </a:solidFill>
+          </a:endParaRPr>
         </a:p>
       </dsp:txBody>
       <dsp:txXfrm>
@@ -7167,7 +7214,7 @@
                 <a:schemeClr val="tx1"/>
               </a:solidFill>
             </a:rPr>
-            <a:t>Alcohol related    (3 mitigators)</a:t>
+            <a:t>Alcohol related    (3 categories)</a:t>
           </a:r>
         </a:p>
       </dsp:txBody>
@@ -10110,7 +10157,7 @@
           <a:p>
             <a:fld id="{9AC988E8-4978-4A11-9118-2FFD3C4079AE}" type="datetimeFigureOut">
               <a:rPr lang="en-GB" smtClean="0"/>
-              <a:t>02/04/2025</a:t>
+              <a:t>01/10/2025</a:t>
             </a:fld>
             <a:endParaRPr lang="en-GB"/>
           </a:p>
@@ -10310,7 +10357,7 @@
           <a:p>
             <a:fld id="{9AC988E8-4978-4A11-9118-2FFD3C4079AE}" type="datetimeFigureOut">
               <a:rPr lang="en-GB" smtClean="0"/>
-              <a:t>02/04/2025</a:t>
+              <a:t>01/10/2025</a:t>
             </a:fld>
             <a:endParaRPr lang="en-GB"/>
           </a:p>
@@ -10520,7 +10567,7 @@
           <a:p>
             <a:fld id="{9AC988E8-4978-4A11-9118-2FFD3C4079AE}" type="datetimeFigureOut">
               <a:rPr lang="en-GB" smtClean="0"/>
-              <a:t>02/04/2025</a:t>
+              <a:t>01/10/2025</a:t>
             </a:fld>
             <a:endParaRPr lang="en-GB"/>
           </a:p>
@@ -10720,7 +10767,7 @@
           <a:p>
             <a:fld id="{9AC988E8-4978-4A11-9118-2FFD3C4079AE}" type="datetimeFigureOut">
               <a:rPr lang="en-GB" smtClean="0"/>
-              <a:t>02/04/2025</a:t>
+              <a:t>01/10/2025</a:t>
             </a:fld>
             <a:endParaRPr lang="en-GB"/>
           </a:p>
@@ -10996,7 +11043,7 @@
           <a:p>
             <a:fld id="{9AC988E8-4978-4A11-9118-2FFD3C4079AE}" type="datetimeFigureOut">
               <a:rPr lang="en-GB" smtClean="0"/>
-              <a:t>02/04/2025</a:t>
+              <a:t>01/10/2025</a:t>
             </a:fld>
             <a:endParaRPr lang="en-GB"/>
           </a:p>
@@ -11264,7 +11311,7 @@
           <a:p>
             <a:fld id="{9AC988E8-4978-4A11-9118-2FFD3C4079AE}" type="datetimeFigureOut">
               <a:rPr lang="en-GB" smtClean="0"/>
-              <a:t>02/04/2025</a:t>
+              <a:t>01/10/2025</a:t>
             </a:fld>
             <a:endParaRPr lang="en-GB"/>
           </a:p>
@@ -11679,7 +11726,7 @@
           <a:p>
             <a:fld id="{9AC988E8-4978-4A11-9118-2FFD3C4079AE}" type="datetimeFigureOut">
               <a:rPr lang="en-GB" smtClean="0"/>
-              <a:t>02/04/2025</a:t>
+              <a:t>01/10/2025</a:t>
             </a:fld>
             <a:endParaRPr lang="en-GB"/>
           </a:p>
@@ -11821,7 +11868,7 @@
           <a:p>
             <a:fld id="{9AC988E8-4978-4A11-9118-2FFD3C4079AE}" type="datetimeFigureOut">
               <a:rPr lang="en-GB" smtClean="0"/>
-              <a:t>02/04/2025</a:t>
+              <a:t>01/10/2025</a:t>
             </a:fld>
             <a:endParaRPr lang="en-GB"/>
           </a:p>
@@ -11934,7 +11981,7 @@
           <a:p>
             <a:fld id="{9AC988E8-4978-4A11-9118-2FFD3C4079AE}" type="datetimeFigureOut">
               <a:rPr lang="en-GB" smtClean="0"/>
-              <a:t>02/04/2025</a:t>
+              <a:t>01/10/2025</a:t>
             </a:fld>
             <a:endParaRPr lang="en-GB"/>
           </a:p>
@@ -12247,7 +12294,7 @@
           <a:p>
             <a:fld id="{9AC988E8-4978-4A11-9118-2FFD3C4079AE}" type="datetimeFigureOut">
               <a:rPr lang="en-GB" smtClean="0"/>
-              <a:t>02/04/2025</a:t>
+              <a:t>01/10/2025</a:t>
             </a:fld>
             <a:endParaRPr lang="en-GB"/>
           </a:p>
@@ -12536,7 +12583,7 @@
           <a:p>
             <a:fld id="{9AC988E8-4978-4A11-9118-2FFD3C4079AE}" type="datetimeFigureOut">
               <a:rPr lang="en-GB" smtClean="0"/>
-              <a:t>02/04/2025</a:t>
+              <a:t>01/10/2025</a:t>
             </a:fld>
             <a:endParaRPr lang="en-GB"/>
           </a:p>
@@ -12779,7 +12826,7 @@
           <a:p>
             <a:fld id="{9AC988E8-4978-4A11-9118-2FFD3C4079AE}" type="datetimeFigureOut">
               <a:rPr lang="en-GB" smtClean="0"/>
-              <a:t>02/04/2025</a:t>
+              <a:t>01/10/2025</a:t>
             </a:fld>
             <a:endParaRPr lang="en-GB"/>
           </a:p>
@@ -13209,7 +13256,7 @@
           <p:nvPr>
             <p:extLst>
               <p:ext uri="{D42A27DB-BD31-4B8C-83A1-F6EECF244321}">
-                <p14:modId xmlns:p14="http://schemas.microsoft.com/office/powerpoint/2010/main" val="91968760"/>
+                <p14:modId xmlns:p14="http://schemas.microsoft.com/office/powerpoint/2010/main" val="1394737860"/>
               </p:ext>
             </p:extLst>
           </p:nvPr>

</xml_diff>